<commit_message>
Add better discussion section
</commit_message>
<xml_diff>
--- a/Poster/WDN_poster_K.pptx
+++ b/Poster/WDN_poster_K.pptx
@@ -366,7 +366,7 @@
               <a:pPr>
                 <a:defRPr/>
               </a:pPr>
-              <a:t>‹nr.›</a:t>
+              <a:t>‹#›</a:t>
             </a:fld>
             <a:endParaRPr lang="da-DK" altLang="en-US" dirty="0"/>
           </a:p>
@@ -580,7 +580,7 @@
               <a:pPr>
                 <a:defRPr/>
               </a:pPr>
-              <a:t>‹nr.›</a:t>
+              <a:t>‹#›</a:t>
             </a:fld>
             <a:endParaRPr lang="da-DK" altLang="en-US" dirty="0"/>
           </a:p>
@@ -804,7 +804,7 @@
               <a:pPr>
                 <a:defRPr/>
               </a:pPr>
-              <a:t>‹nr.›</a:t>
+              <a:t>‹#›</a:t>
             </a:fld>
             <a:endParaRPr lang="da-DK" altLang="en-US" dirty="0"/>
           </a:p>
@@ -1018,7 +1018,7 @@
               <a:pPr>
                 <a:defRPr/>
               </a:pPr>
-              <a:t>‹nr.›</a:t>
+              <a:t>‹#›</a:t>
             </a:fld>
             <a:endParaRPr lang="da-DK" altLang="en-US" dirty="0"/>
           </a:p>
@@ -1254,7 +1254,7 @@
               <a:pPr>
                 <a:defRPr/>
               </a:pPr>
-              <a:t>‹nr.›</a:t>
+              <a:t>‹#›</a:t>
             </a:fld>
             <a:endParaRPr lang="da-DK" altLang="en-US" dirty="0"/>
           </a:p>
@@ -1586,7 +1586,7 @@
               <a:pPr>
                 <a:defRPr/>
               </a:pPr>
-              <a:t>‹nr.›</a:t>
+              <a:t>‹#›</a:t>
             </a:fld>
             <a:endParaRPr lang="da-DK" altLang="en-US" dirty="0"/>
           </a:p>
@@ -2052,7 +2052,7 @@
               <a:pPr>
                 <a:defRPr/>
               </a:pPr>
-              <a:t>‹nr.›</a:t>
+              <a:t>‹#›</a:t>
             </a:fld>
             <a:endParaRPr lang="da-DK" altLang="en-US" dirty="0"/>
           </a:p>
@@ -2214,7 +2214,7 @@
               <a:pPr>
                 <a:defRPr/>
               </a:pPr>
-              <a:t>‹nr.›</a:t>
+              <a:t>‹#›</a:t>
             </a:fld>
             <a:endParaRPr lang="da-DK" altLang="en-US" dirty="0"/>
           </a:p>
@@ -2353,7 +2353,7 @@
               <a:pPr>
                 <a:defRPr/>
               </a:pPr>
-              <a:t>‹nr.›</a:t>
+              <a:t>‹#›</a:t>
             </a:fld>
             <a:endParaRPr lang="da-DK" altLang="en-US" dirty="0"/>
           </a:p>
@@ -2674,7 +2674,7 @@
               <a:pPr>
                 <a:defRPr/>
               </a:pPr>
-              <a:t>‹nr.›</a:t>
+              <a:t>‹#›</a:t>
             </a:fld>
             <a:endParaRPr lang="da-DK" altLang="en-US" dirty="0"/>
           </a:p>
@@ -2972,7 +2972,7 @@
               <a:pPr>
                 <a:defRPr/>
               </a:pPr>
-              <a:t>‹nr.›</a:t>
+              <a:t>‹#›</a:t>
             </a:fld>
             <a:endParaRPr lang="da-DK" altLang="en-US" dirty="0"/>
           </a:p>
@@ -3333,7 +3333,7 @@
               <a:pPr>
                 <a:defRPr/>
               </a:pPr>
-              <a:t>‹nr.›</a:t>
+              <a:t>‹#›</a:t>
             </a:fld>
             <a:endParaRPr lang="da-DK" altLang="en-US" dirty="0"/>
           </a:p>
@@ -6355,9 +6355,9 @@
         <p:grpSpPr bwMode="auto">
           <a:xfrm>
             <a:off x="333920" y="33974936"/>
-            <a:ext cx="14706600" cy="5851525"/>
+            <a:ext cx="14706600" cy="5863490"/>
             <a:chOff x="15123210" y="5326064"/>
-            <a:chExt cx="14705915" cy="23926801"/>
+            <a:chExt cx="14705915" cy="23975726"/>
           </a:xfrm>
         </p:grpSpPr>
         <p:sp>
@@ -6736,7 +6736,7 @@
           <p:spPr bwMode="auto">
             <a:xfrm>
               <a:off x="15656585" y="12563822"/>
-              <a:ext cx="13867754" cy="10392517"/>
+              <a:ext cx="13867754" cy="16737968"/>
             </a:xfrm>
             <a:prstGeom prst="rect">
               <a:avLst/>
@@ -6752,143 +6752,82 @@
             </a:bodyPr>
             <a:lstStyle/>
             <a:p>
-              <a:pPr marL="342900" indent="-342900" algn="just" defTabSz="4173538" eaLnBrk="1" hangingPunct="1">
-                <a:defRPr/>
-              </a:pPr>
-              <a:r>
-                <a:rPr lang="en-GB" sz="2600" dirty="0">
-                  <a:latin typeface="Arial" charset="0"/>
-                </a:rPr>
-                <a:t>May be some text in bullet form: </a:t>
-              </a:r>
-            </a:p>
-            <a:p>
-              <a:pPr marL="514350" indent="-514350" algn="just" defTabSz="4173538" eaLnBrk="1" hangingPunct="1">
+              <a:pPr marL="514350" indent="-514350" defTabSz="4173538" eaLnBrk="1" hangingPunct="1">
                 <a:buFont typeface="+mj-lt"/>
                 <a:buAutoNum type="arabicPeriod"/>
                 <a:defRPr/>
               </a:pPr>
               <a:r>
                 <a:rPr lang="en-GB" sz="2600" dirty="0">
-                  <a:latin typeface="Arial" charset="0"/>
+                  <a:latin typeface="Helvetica" panose="020B0604020202020204" pitchFamily="34" charset="0"/>
+                  <a:cs typeface="Helvetica" panose="020B0604020202020204" pitchFamily="34" charset="0"/>
                 </a:rPr>
-                <a:t>Disturbance estimation with Kalman filter (For feed-forward?)</a:t>
+                <a:t>Disturbance estimation with Kalman filter for feed forward to LQR requires increase of controller bandwidth to avoid synchronisation.</a:t>
               </a:r>
             </a:p>
             <a:p>
-              <a:pPr marL="514350" indent="-514350" algn="just" defTabSz="4173538" eaLnBrk="1" hangingPunct="1">
+              <a:pPr marL="514350" indent="-514350" defTabSz="4173538" eaLnBrk="1" hangingPunct="1">
                 <a:buFont typeface="+mj-lt"/>
                 <a:buAutoNum type="arabicPeriod"/>
                 <a:defRPr/>
               </a:pPr>
               <a:r>
                 <a:rPr lang="en-GB" sz="2600" dirty="0">
-                  <a:latin typeface="Arial" charset="0"/>
+                  <a:latin typeface="Helvetica" panose="020B0604020202020204" pitchFamily="34" charset="0"/>
+                  <a:cs typeface="Helvetica" panose="020B0604020202020204" pitchFamily="34" charset="0"/>
                 </a:rPr>
-                <a:t>Package loss simulation (sensitivity to packet losses)</a:t>
+                <a:t>Kalman filter has to be stiff/slow to allow for leakage detection – limits disturbance estimation.</a:t>
               </a:r>
             </a:p>
             <a:p>
-              <a:pPr marL="514350" indent="-514350" algn="just" defTabSz="4173538" eaLnBrk="1" hangingPunct="1">
+              <a:pPr marL="514350" indent="-514350" defTabSz="4173538" eaLnBrk="1" hangingPunct="1">
                 <a:buFont typeface="+mj-lt"/>
                 <a:buAutoNum type="arabicPeriod"/>
                 <a:defRPr/>
               </a:pPr>
               <a:r>
                 <a:rPr lang="en-GB" sz="2600" dirty="0">
-                  <a:latin typeface="Arial" charset="0"/>
+                  <a:latin typeface="Helvetica" panose="020B0604020202020204" pitchFamily="34" charset="0"/>
+                  <a:cs typeface="Helvetica" panose="020B0604020202020204" pitchFamily="34" charset="0"/>
                 </a:rPr>
-                <a:t>Cascaded control!!!!!!! (slow and fast dynamics are separated)</a:t>
+                <a:t>Increased LQR bandwidth decreases the time separation between inner and outer loop, suggesting cascaded control may be worse off than intended.</a:t>
               </a:r>
             </a:p>
             <a:p>
-              <a:pPr marL="514350" indent="-514350" algn="just" defTabSz="4173538" eaLnBrk="1" hangingPunct="1">
+              <a:pPr marL="514350" indent="-514350" defTabSz="4173538" eaLnBrk="1" hangingPunct="1">
                 <a:buFont typeface="+mj-lt"/>
                 <a:buAutoNum type="arabicPeriod"/>
                 <a:defRPr/>
               </a:pPr>
               <a:r>
                 <a:rPr lang="en-GB" sz="2600" dirty="0">
-                  <a:latin typeface="Arial" charset="0"/>
+                  <a:latin typeface="Helvetica" panose="020B0604020202020204" pitchFamily="34" charset="0"/>
+                  <a:cs typeface="Helvetica" panose="020B0604020202020204" pitchFamily="34" charset="0"/>
                 </a:rPr>
-                <a:t>Linearisation</a:t>
+                <a:t>Delay not is in simulation – could be cause of oscillations in for pump controllers. Coupling lost between pumps seen in lab must have been lost in linearisation.</a:t>
               </a:r>
             </a:p>
             <a:p>
-              <a:pPr marL="514350" indent="-514350" algn="just" defTabSz="4173538" eaLnBrk="1" hangingPunct="1">
+              <a:pPr marL="514350" indent="-514350" defTabSz="4173538" eaLnBrk="1" hangingPunct="1">
                 <a:buFont typeface="+mj-lt"/>
                 <a:buAutoNum type="arabicPeriod"/>
                 <a:defRPr/>
               </a:pPr>
               <a:r>
                 <a:rPr lang="en-GB" sz="2600" dirty="0">
-                  <a:latin typeface="Arial" charset="0"/>
+                  <a:latin typeface="Helvetica" panose="020B0604020202020204" pitchFamily="34" charset="0"/>
+                  <a:cs typeface="Helvetica" panose="020B0604020202020204" pitchFamily="34" charset="0"/>
                 </a:rPr>
-                <a:t>Synchronisation between Kalman and LQR</a:t>
+                <a:t>Reliability of system due to package loss suggests marginally stable system.</a:t>
               </a:r>
             </a:p>
             <a:p>
-              <a:pPr marL="514350" indent="-514350" algn="just" defTabSz="4173538" eaLnBrk="1" hangingPunct="1">
-                <a:buFont typeface="+mj-lt"/>
-                <a:buAutoNum type="arabicPeriod"/>
-                <a:defRPr/>
-              </a:pPr>
-              <a:r>
-                <a:rPr lang="en-GB" sz="2600" dirty="0" err="1">
-                  <a:latin typeface="Arial" charset="0"/>
-                </a:rPr>
-                <a:t>Padé</a:t>
-              </a:r>
-              <a:r>
-                <a:rPr lang="en-GB" sz="2600" dirty="0">
-                  <a:latin typeface="Arial" charset="0"/>
-                </a:rPr>
-                <a:t> approximation influence on inner loop</a:t>
-              </a:r>
-            </a:p>
-            <a:p>
-              <a:pPr marL="514350" indent="-514350" algn="just" defTabSz="4173538" eaLnBrk="1" hangingPunct="1">
-                <a:buFont typeface="+mj-lt"/>
-                <a:buAutoNum type="arabicPeriod"/>
-                <a:defRPr/>
-              </a:pPr>
-              <a:r>
-                <a:rPr lang="en-GB" sz="2600" dirty="0">
-                  <a:latin typeface="Arial" charset="0"/>
-                </a:rPr>
-                <a:t>Leakage detection limitations (leakage has to be sudden and large)</a:t>
-              </a:r>
-            </a:p>
-            <a:p>
-              <a:pPr marL="514350" indent="-514350" algn="just" defTabSz="4173538" eaLnBrk="1" hangingPunct="1">
-                <a:buFont typeface="+mj-lt"/>
-                <a:buAutoNum type="arabicPeriod"/>
-                <a:defRPr/>
-              </a:pPr>
-              <a:r>
-                <a:rPr lang="en-GB" sz="2600" dirty="0">
-                  <a:latin typeface="Arial" charset="0"/>
-                </a:rPr>
-                <a:t>Diagonalized system when linearised but not so much in </a:t>
-              </a:r>
-              <a:r>
-                <a:rPr lang="en-GB" sz="2600" dirty="0" err="1">
-                  <a:latin typeface="Arial" charset="0"/>
-                </a:rPr>
-                <a:t>realitiy</a:t>
-              </a:r>
-              <a:endParaRPr lang="en-GB" sz="2600" dirty="0">
-                <a:latin typeface="Arial" charset="0"/>
-              </a:endParaRPr>
-            </a:p>
-            <a:p>
-              <a:pPr marL="514350" indent="-514350" algn="just" defTabSz="4173538" eaLnBrk="1" hangingPunct="1">
-                <a:buFont typeface="+mj-lt"/>
-                <a:buAutoNum type="arabicPeriod"/>
+              <a:pPr algn="just" defTabSz="4173538" eaLnBrk="1" hangingPunct="1">
                 <a:defRPr/>
               </a:pPr>
               <a:endParaRPr lang="en-GB" sz="2600" dirty="0">
-                <a:latin typeface="Arial" charset="0"/>
+                <a:latin typeface="Helvetica" panose="020B0604020202020204" pitchFamily="34" charset="0"/>
+                <a:cs typeface="Helvetica" panose="020B0604020202020204" pitchFamily="34" charset="0"/>
               </a:endParaRPr>
             </a:p>
           </p:txBody>

</xml_diff>